<commit_message>
updated presentation and load data
</commit_message>
<xml_diff>
--- a/projects/final_project/final_presentation.pptx
+++ b/projects/final_project/final_presentation.pptx
@@ -2952,7 +2952,7 @@
           <a:p>
             <a:fld id="{6A4B53A7-3209-46A6-9454-F38EAC8F11E7}" type="datetimeFigureOut">
               <a:rPr lang="en-US" smtClean="0"/>
-              <a:t>12/7/21</a:t>
+              <a:t>12/8/21</a:t>
             </a:fld>
             <a:endParaRPr lang="en-US"/>
           </a:p>
@@ -3203,7 +3203,7 @@
           <a:p>
             <a:fld id="{6A4B53A7-3209-46A6-9454-F38EAC8F11E7}" type="datetimeFigureOut">
               <a:rPr lang="en-US" smtClean="0"/>
-              <a:t>12/7/21</a:t>
+              <a:t>12/8/21</a:t>
             </a:fld>
             <a:endParaRPr lang="en-US"/>
           </a:p>
@@ -3464,7 +3464,7 @@
           <a:p>
             <a:fld id="{6A4B53A7-3209-46A6-9454-F38EAC8F11E7}" type="datetimeFigureOut">
               <a:rPr lang="en-US" smtClean="0"/>
-              <a:t>12/7/21</a:t>
+              <a:t>12/8/21</a:t>
             </a:fld>
             <a:endParaRPr lang="en-US"/>
           </a:p>
@@ -3715,7 +3715,7 @@
           <a:p>
             <a:fld id="{6A4B53A7-3209-46A6-9454-F38EAC8F11E7}" type="datetimeFigureOut">
               <a:rPr lang="en-US" smtClean="0"/>
-              <a:t>12/7/21</a:t>
+              <a:t>12/8/21</a:t>
             </a:fld>
             <a:endParaRPr lang="en-US"/>
           </a:p>
@@ -4043,7 +4043,7 @@
           <a:p>
             <a:fld id="{6A4B53A7-3209-46A6-9454-F38EAC8F11E7}" type="datetimeFigureOut">
               <a:rPr lang="en-US" smtClean="0"/>
-              <a:t>12/7/21</a:t>
+              <a:t>12/8/21</a:t>
             </a:fld>
             <a:endParaRPr lang="en-US"/>
           </a:p>
@@ -4361,7 +4361,7 @@
           <a:p>
             <a:fld id="{6A4B53A7-3209-46A6-9454-F38EAC8F11E7}" type="datetimeFigureOut">
               <a:rPr lang="en-US" smtClean="0"/>
-              <a:t>12/7/21</a:t>
+              <a:t>12/8/21</a:t>
             </a:fld>
             <a:endParaRPr lang="en-US"/>
           </a:p>
@@ -4826,7 +4826,7 @@
           <a:p>
             <a:fld id="{6A4B53A7-3209-46A6-9454-F38EAC8F11E7}" type="datetimeFigureOut">
               <a:rPr lang="en-US" smtClean="0"/>
-              <a:t>12/7/21</a:t>
+              <a:t>12/8/21</a:t>
             </a:fld>
             <a:endParaRPr lang="en-US"/>
           </a:p>
@@ -5020,7 +5020,7 @@
           <a:p>
             <a:fld id="{6A4B53A7-3209-46A6-9454-F38EAC8F11E7}" type="datetimeFigureOut">
               <a:rPr lang="en-US" smtClean="0"/>
-              <a:t>12/7/21</a:t>
+              <a:t>12/8/21</a:t>
             </a:fld>
             <a:endParaRPr lang="en-US"/>
           </a:p>
@@ -5186,7 +5186,7 @@
           <a:p>
             <a:fld id="{6A4B53A7-3209-46A6-9454-F38EAC8F11E7}" type="datetimeFigureOut">
               <a:rPr lang="en-US" smtClean="0"/>
-              <a:t>12/7/21</a:t>
+              <a:t>12/8/21</a:t>
             </a:fld>
             <a:endParaRPr lang="en-US"/>
           </a:p>
@@ -5550,7 +5550,7 @@
           <a:p>
             <a:fld id="{6A4B53A7-3209-46A6-9454-F38EAC8F11E7}" type="datetimeFigureOut">
               <a:rPr lang="en-US" smtClean="0"/>
-              <a:t>12/7/21</a:t>
+              <a:t>12/8/21</a:t>
             </a:fld>
             <a:endParaRPr lang="en-US"/>
           </a:p>
@@ -5894,7 +5894,7 @@
           <a:p>
             <a:fld id="{6A4B53A7-3209-46A6-9454-F38EAC8F11E7}" type="datetimeFigureOut">
               <a:rPr lang="en-US" smtClean="0"/>
-              <a:t>12/7/21</a:t>
+              <a:t>12/8/21</a:t>
             </a:fld>
             <a:endParaRPr lang="en-US"/>
           </a:p>
@@ -6189,7 +6189,7 @@
             <a:fld id="{6A4B53A7-3209-46A6-9454-F38EAC8F11E7}" type="datetimeFigureOut">
               <a:rPr lang="en-US" smtClean="0"/>
               <a:pPr/>
-              <a:t>12/7/21</a:t>
+              <a:t>12/8/21</a:t>
             </a:fld>
             <a:endParaRPr lang="en-US" dirty="0"/>
           </a:p>
@@ -8893,7 +8893,7 @@
             <a:pPr algn="ctr"/>
             <a:r>
               <a:rPr lang="en-US" dirty="0"/>
-              <a:t>Deploy on </a:t>
+              <a:t>Deploy as </a:t>
             </a:r>
             <a:r>
               <a:rPr lang="en-US" b="1" dirty="0">
@@ -8901,7 +8901,7 @@
                   <a:schemeClr val="bg1"/>
                 </a:solidFill>
               </a:rPr>
-              <a:t>Heroku</a:t>
+              <a:t>an App</a:t>
             </a:r>
             <a:r>
               <a:rPr lang="en-US" dirty="0"/>
@@ -12639,8 +12639,8 @@
               <a:buChar char="•"/>
             </a:pPr>
             <a:r>
-              <a:rPr lang="en-US" dirty="0"/>
-              <a:t>Vaccine / Omicron</a:t>
+              <a:rPr lang="en-US" sz="1600" dirty="0"/>
+              <a:t>Left and Right similarities</a:t>
             </a:r>
           </a:p>
           <a:p>
@@ -12655,8 +12655,8 @@
               <a:buChar char="•"/>
             </a:pPr>
             <a:r>
-              <a:rPr lang="en-US" dirty="0"/>
-              <a:t>Washington / Mandate</a:t>
+              <a:rPr lang="en-US" sz="1600" dirty="0"/>
+              <a:t>Left focus on science, studies, vaccines</a:t>
             </a:r>
           </a:p>
           <a:p>
@@ -12671,8 +12671,8 @@
               <a:buChar char="•"/>
             </a:pPr>
             <a:r>
-              <a:rPr lang="en-US" dirty="0"/>
-              <a:t>Global Words</a:t>
+              <a:rPr lang="en-US" sz="1600" dirty="0"/>
+              <a:t>Right focus on mandates, sports, children</a:t>
             </a:r>
           </a:p>
           <a:p>
@@ -12687,34 +12687,18 @@
               <a:buChar char="•"/>
             </a:pPr>
             <a:r>
-              <a:rPr lang="en-US" dirty="0"/>
-              <a:t>Sports</a:t>
-            </a:r>
-          </a:p>
-          <a:p>
-            <a:pPr marL="742950" lvl="1" indent="-228600">
-              <a:lnSpc>
-                <a:spcPct val="90000"/>
-              </a:lnSpc>
-              <a:spcAft>
-                <a:spcPts val="600"/>
-              </a:spcAft>
-              <a:buFont typeface="Arial" panose="020B0604020202020204" pitchFamily="34" charset="0"/>
-              <a:buChar char="•"/>
-            </a:pPr>
-            <a:r>
-              <a:rPr lang="en-US" dirty="0"/>
-              <a:t>Children</a:t>
+              <a:rPr lang="en-US" sz="1600" dirty="0"/>
+              <a:t>Center focus on global</a:t>
             </a:r>
           </a:p>
         </p:txBody>
       </p:sp>
       <p:pic>
         <p:nvPicPr>
-          <p:cNvPr id="3080" name="Picture 8">
-            <a:extLst>
-              <a:ext uri="{FF2B5EF4-FFF2-40B4-BE49-F238E27FC236}">
-                <a16:creationId xmlns:a16="http://schemas.microsoft.com/office/drawing/2014/main" id="{150BBCE3-B426-DC49-B799-A3D07C937599}"/>
+          <p:cNvPr id="3074" name="Picture 2">
+            <a:extLst>
+              <a:ext uri="{FF2B5EF4-FFF2-40B4-BE49-F238E27FC236}">
+                <a16:creationId xmlns:a16="http://schemas.microsoft.com/office/drawing/2014/main" id="{73629723-CDFE-2B4A-A395-CAFCB250BE1D}"/>
               </a:ext>
             </a:extLst>
           </p:cNvPr>
@@ -12723,7 +12707,7 @@
           </p:cNvPicPr>
           <p:nvPr/>
         </p:nvPicPr>
-        <p:blipFill>
+        <p:blipFill rotWithShape="1">
           <a:blip r:embed="rId2">
             <a:extLst>
               <a:ext uri="{28A0092B-C50C-407E-A947-70E740481C1C}">
@@ -12731,14 +12715,12 @@
               </a:ext>
             </a:extLst>
           </a:blip>
-          <a:srcRect/>
-          <a:stretch>
-            <a:fillRect/>
-          </a:stretch>
+          <a:srcRect l="19079" t="10859" r="20480" b="10156"/>
+          <a:stretch/>
         </p:blipFill>
         <p:spPr bwMode="auto">
           <a:xfrm>
-            <a:off x="985832" y="136420"/>
+            <a:off x="985833" y="136421"/>
             <a:ext cx="2012272" cy="2049340"/>
           </a:xfrm>
           <a:prstGeom prst="rect">
@@ -12758,10 +12740,10 @@
       </p:pic>
       <p:pic>
         <p:nvPicPr>
-          <p:cNvPr id="3076" name="Picture 4">
-            <a:extLst>
-              <a:ext uri="{FF2B5EF4-FFF2-40B4-BE49-F238E27FC236}">
-                <a16:creationId xmlns:a16="http://schemas.microsoft.com/office/drawing/2014/main" id="{1CEB0EE1-F096-564A-A9C1-2AF1D5A56AC0}"/>
+          <p:cNvPr id="3" name="Picture 4">
+            <a:extLst>
+              <a:ext uri="{FF2B5EF4-FFF2-40B4-BE49-F238E27FC236}">
+                <a16:creationId xmlns:a16="http://schemas.microsoft.com/office/drawing/2014/main" id="{6F9D361A-CBC9-6848-A6DE-7000BDD23AF1}"/>
               </a:ext>
             </a:extLst>
           </p:cNvPr>
@@ -12778,7 +12760,7 @@
               </a:ext>
             </a:extLst>
           </a:blip>
-          <a:srcRect l="27455" t="17656" r="26173" b="21477"/>
+          <a:srcRect l="21808" t="10156" r="20773" b="7135"/>
           <a:stretch/>
         </p:blipFill>
         <p:spPr bwMode="auto">
@@ -12803,10 +12785,10 @@
       </p:pic>
       <p:pic>
         <p:nvPicPr>
-          <p:cNvPr id="3078" name="Picture 6">
-            <a:extLst>
-              <a:ext uri="{FF2B5EF4-FFF2-40B4-BE49-F238E27FC236}">
-                <a16:creationId xmlns:a16="http://schemas.microsoft.com/office/drawing/2014/main" id="{82C16138-C8CF-6047-AC0C-C60F79DCB682}"/>
+          <p:cNvPr id="4" name="Picture 6">
+            <a:extLst>
+              <a:ext uri="{FF2B5EF4-FFF2-40B4-BE49-F238E27FC236}">
+                <a16:creationId xmlns:a16="http://schemas.microsoft.com/office/drawing/2014/main" id="{FAFC7865-E35A-2644-B89A-DF81216CCB16}"/>
               </a:ext>
             </a:extLst>
           </p:cNvPr>
@@ -12823,12 +12805,12 @@
               </a:ext>
             </a:extLst>
           </a:blip>
-          <a:srcRect l="24277" t="15547" r="25502" b="13671"/>
+          <a:srcRect l="20880" t="10391" r="16629" b="9688"/>
           <a:stretch/>
         </p:blipFill>
         <p:spPr bwMode="auto">
           <a:xfrm>
-            <a:off x="1985964" y="2405452"/>
+            <a:off x="1985965" y="2405452"/>
             <a:ext cx="2012272" cy="2049340"/>
           </a:xfrm>
           <a:prstGeom prst="rect">
@@ -14199,10 +14181,10 @@
       </p:cxnSp>
       <p:pic>
         <p:nvPicPr>
-          <p:cNvPr id="5" name="Picture 14">
-            <a:extLst>
-              <a:ext uri="{FF2B5EF4-FFF2-40B4-BE49-F238E27FC236}">
-                <a16:creationId xmlns:a16="http://schemas.microsoft.com/office/drawing/2014/main" id="{584D0838-BDA2-B84D-B0A6-B7B6C02C3198}"/>
+          <p:cNvPr id="2050" name="Picture 2">
+            <a:extLst>
+              <a:ext uri="{FF2B5EF4-FFF2-40B4-BE49-F238E27FC236}">
+                <a16:creationId xmlns:a16="http://schemas.microsoft.com/office/drawing/2014/main" id="{7D8D6F05-C32E-D14B-8CA5-02558BFEC40E}"/>
               </a:ext>
             </a:extLst>
           </p:cNvPr>
@@ -14219,13 +14201,13 @@
               </a:ext>
             </a:extLst>
           </a:blip>
-          <a:srcRect t="24491" b="27421"/>
+          <a:srcRect t="23283" b="22105"/>
           <a:stretch/>
         </p:blipFill>
         <p:spPr bwMode="auto">
           <a:xfrm>
-            <a:off x="384005" y="1389124"/>
-            <a:ext cx="11423989" cy="3924000"/>
+            <a:off x="377485" y="1174837"/>
+            <a:ext cx="11483984" cy="4479728"/>
           </a:xfrm>
           <a:prstGeom prst="rect">
             <a:avLst/>
@@ -14689,7 +14671,7 @@
             </a:pPr>
             <a:r>
               <a:rPr lang="en-US" dirty="0"/>
-              <a:t>All engineered stats statistically significant to include in model</a:t>
+              <a:t>Most engineered stats statistically significant to include in model</a:t>
             </a:r>
           </a:p>
           <a:p>
@@ -14705,11 +14687,11 @@
             </a:pPr>
             <a:r>
               <a:rPr lang="en-US" dirty="0" err="1"/>
-              <a:t>n_unique</a:t>
+              <a:t>Predictor_length</a:t>
             </a:r>
             <a:r>
               <a:rPr lang="en-US" dirty="0"/>
-              <a:t> Significance (p = 1e-108)</a:t>
+              <a:t> (p = .43)</a:t>
             </a:r>
           </a:p>
           <a:p>
@@ -14725,19 +14707,11 @@
             </a:pPr>
             <a:r>
               <a:rPr lang="en-US" dirty="0" err="1"/>
-              <a:t>n_poly</a:t>
+              <a:t>Unique_wors_ratio</a:t>
             </a:r>
             <a:r>
               <a:rPr lang="en-US" dirty="0"/>
-              <a:t> </a:t>
-            </a:r>
-            <a:r>
-              <a:rPr lang="en-US" dirty="0" err="1"/>
-              <a:t>Signifcance</a:t>
-            </a:r>
-            <a:r>
-              <a:rPr lang="en-US" dirty="0"/>
-              <a:t> (p = 4e-145)</a:t>
+              <a:t> (p = 2e-14)</a:t>
             </a:r>
           </a:p>
         </p:txBody>
@@ -15621,7 +15595,7 @@
                   <a:schemeClr val="bg1"/>
                 </a:solidFill>
               </a:rPr>
-              <a:t>83.2</a:t>
+              <a:t>83.87</a:t>
             </a:r>
             <a:r>
               <a:rPr lang="en-US" sz="4000" b="1" i="0" kern="1200" cap="all" baseline="0" dirty="0">
@@ -15667,12 +15641,20 @@
               <a:t>Bagged Logit + </a:t>
             </a:r>
             <a:r>
+              <a:rPr lang="en-US" sz="2800" b="1" cap="all" dirty="0" err="1">
+                <a:solidFill>
+                  <a:schemeClr val="bg1"/>
+                </a:solidFill>
+              </a:rPr>
+              <a:t>Ngrams</a:t>
+            </a:r>
+            <a:r>
               <a:rPr lang="en-US" sz="2800" b="1" cap="all" dirty="0">
                 <a:solidFill>
                   <a:schemeClr val="bg1"/>
                 </a:solidFill>
               </a:rPr>
-              <a:t>TFIDF </a:t>
+              <a:t> </a:t>
             </a:r>
             <a:r>
               <a:rPr lang="en-US" sz="2800" b="1" i="0" kern="1200" cap="all" baseline="0" dirty="0">
@@ -16816,10 +16798,10 @@
       </p:sp>
       <p:pic>
         <p:nvPicPr>
-          <p:cNvPr id="7174" name="Picture 6">
-            <a:extLst>
-              <a:ext uri="{FF2B5EF4-FFF2-40B4-BE49-F238E27FC236}">
-                <a16:creationId xmlns:a16="http://schemas.microsoft.com/office/drawing/2014/main" id="{664CA758-A11E-7643-B29E-540CCF2EF97E}"/>
+          <p:cNvPr id="1026" name="Picture 2">
+            <a:extLst>
+              <a:ext uri="{FF2B5EF4-FFF2-40B4-BE49-F238E27FC236}">
+                <a16:creationId xmlns:a16="http://schemas.microsoft.com/office/drawing/2014/main" id="{1F559ED0-AF33-B745-882D-D94C3EC58D63}"/>
               </a:ext>
             </a:extLst>
           </p:cNvPr>
@@ -16843,8 +16825,8 @@
         </p:blipFill>
         <p:spPr bwMode="auto">
           <a:xfrm>
-            <a:off x="6076510" y="1824340"/>
-            <a:ext cx="5585641" cy="3989744"/>
+            <a:off x="414319" y="1968021"/>
+            <a:ext cx="5255857" cy="3754184"/>
           </a:xfrm>
           <a:prstGeom prst="rect">
             <a:avLst/>
@@ -16863,10 +16845,10 @@
       </p:pic>
       <p:pic>
         <p:nvPicPr>
-          <p:cNvPr id="7176" name="Picture 8">
-            <a:extLst>
-              <a:ext uri="{FF2B5EF4-FFF2-40B4-BE49-F238E27FC236}">
-                <a16:creationId xmlns:a16="http://schemas.microsoft.com/office/drawing/2014/main" id="{F533845E-18E5-4948-90E7-3033A13C6D20}"/>
+          <p:cNvPr id="1028" name="Picture 4">
+            <a:extLst>
+              <a:ext uri="{FF2B5EF4-FFF2-40B4-BE49-F238E27FC236}">
+                <a16:creationId xmlns:a16="http://schemas.microsoft.com/office/drawing/2014/main" id="{98EBC3F1-9A26-0140-B7FF-0D9F50E16C00}"/>
               </a:ext>
             </a:extLst>
           </p:cNvPr>
@@ -16890,8 +16872,8 @@
         </p:blipFill>
         <p:spPr bwMode="auto">
           <a:xfrm>
-            <a:off x="431296" y="1791120"/>
-            <a:ext cx="5645214" cy="4032296"/>
+            <a:off x="5971747" y="1789490"/>
+            <a:ext cx="5711803" cy="4079859"/>
           </a:xfrm>
           <a:prstGeom prst="rect">
             <a:avLst/>

</xml_diff>